<commit_message>
Add SW architecture page for Jenkins+k8s+Docker
</commit_message>
<xml_diff>
--- a/architecture/SW-Architecture.pptx
+++ b/architecture/SW-Architecture.pptx
@@ -5,11 +5,12 @@
     <p:sldMasterId id="2147483684" r:id="rId1"/>
   </p:sldMasterIdLst>
   <p:notesMasterIdLst>
-    <p:notesMasterId r:id="rId4"/>
+    <p:notesMasterId r:id="rId5"/>
   </p:notesMasterIdLst>
   <p:sldIdLst>
     <p:sldId id="258" r:id="rId2"/>
     <p:sldId id="259" r:id="rId3"/>
+    <p:sldId id="260" r:id="rId4"/>
   </p:sldIdLst>
   <p:sldSz cx="8280400" cy="5400675"/>
   <p:notesSz cx="6858000" cy="9144000"/>
@@ -210,7 +211,7 @@
           <a:p>
             <a:fld id="{94F99229-3BAB-5346-9BC8-76595F492884}" type="datetimeFigureOut">
               <a:rPr kumimoji="1" lang="ko-Kore-KR" altLang="en-US" smtClean="0"/>
-              <a:t>2020. 8. 24.</a:t>
+              <a:t>09/24/2020</a:t>
             </a:fld>
             <a:endParaRPr kumimoji="1" lang="ko-Kore-KR" altLang="en-US"/>
           </a:p>
@@ -562,6 +563,90 @@
 </p:notes>
 </file>
 
+<file path=ppt/notesSlides/notesSlide2.xml><?xml version="1.0" encoding="utf-8"?>
+<p:notes xmlns:a="http://schemas.openxmlformats.org/drawingml/2006/main" xmlns:r="http://schemas.openxmlformats.org/officeDocument/2006/relationships" xmlns:p="http://schemas.openxmlformats.org/presentationml/2006/main">
+  <p:cSld>
+    <p:spTree>
+      <p:nvGrpSpPr>
+        <p:cNvPr id="1" name=""/>
+        <p:cNvGrpSpPr/>
+        <p:nvPr/>
+      </p:nvGrpSpPr>
+      <p:grpSpPr>
+        <a:xfrm>
+          <a:off x="0" y="0"/>
+          <a:ext cx="0" cy="0"/>
+          <a:chOff x="0" y="0"/>
+          <a:chExt cx="0" cy="0"/>
+        </a:xfrm>
+      </p:grpSpPr>
+      <p:sp>
+        <p:nvSpPr>
+          <p:cNvPr id="2" name="슬라이드 이미지 개체 틀 1"/>
+          <p:cNvSpPr>
+            <a:spLocks noGrp="1" noRot="1" noChangeAspect="1"/>
+          </p:cNvSpPr>
+          <p:nvPr>
+            <p:ph type="sldImg"/>
+          </p:nvPr>
+        </p:nvSpPr>
+        <p:spPr/>
+      </p:sp>
+      <p:sp>
+        <p:nvSpPr>
+          <p:cNvPr id="3" name="슬라이드 노트 개체 틀 2"/>
+          <p:cNvSpPr>
+            <a:spLocks noGrp="1"/>
+          </p:cNvSpPr>
+          <p:nvPr>
+            <p:ph type="body" idx="1"/>
+          </p:nvPr>
+        </p:nvSpPr>
+        <p:spPr/>
+        <p:txBody>
+          <a:bodyPr/>
+          <a:lstStyle/>
+          <a:p>
+            <a:endParaRPr kumimoji="1" lang="ko-Kore-KR" altLang="en-US" dirty="0"/>
+          </a:p>
+        </p:txBody>
+      </p:sp>
+      <p:sp>
+        <p:nvSpPr>
+          <p:cNvPr id="4" name="슬라이드 번호 개체 틀 3"/>
+          <p:cNvSpPr>
+            <a:spLocks noGrp="1"/>
+          </p:cNvSpPr>
+          <p:nvPr>
+            <p:ph type="sldNum" sz="quarter" idx="5"/>
+          </p:nvPr>
+        </p:nvSpPr>
+        <p:spPr/>
+        <p:txBody>
+          <a:bodyPr/>
+          <a:lstStyle/>
+          <a:p>
+            <a:fld id="{FB5EF575-5036-7245-858F-FA37BB10D499}" type="slidenum">
+              <a:rPr kumimoji="1" lang="ko-Kore-KR" altLang="en-US" smtClean="0"/>
+              <a:t>3</a:t>
+            </a:fld>
+            <a:endParaRPr kumimoji="1" lang="ko-Kore-KR" altLang="en-US"/>
+          </a:p>
+        </p:txBody>
+      </p:sp>
+    </p:spTree>
+    <p:extLst>
+      <p:ext uri="{BB962C8B-B14F-4D97-AF65-F5344CB8AC3E}">
+        <p14:creationId xmlns:p14="http://schemas.microsoft.com/office/powerpoint/2010/main" val="1915292335"/>
+      </p:ext>
+    </p:extLst>
+  </p:cSld>
+  <p:clrMapOvr>
+    <a:masterClrMapping/>
+  </p:clrMapOvr>
+</p:notes>
+</file>
+
 <file path=ppt/slideLayouts/slideLayout1.xml><?xml version="1.0" encoding="utf-8"?>
 <p:sldLayout xmlns:a="http://schemas.openxmlformats.org/drawingml/2006/main" xmlns:r="http://schemas.openxmlformats.org/officeDocument/2006/relationships" xmlns:p="http://schemas.openxmlformats.org/presentationml/2006/main" type="title" preserve="1">
   <p:cSld name="제목 슬라이드">
@@ -693,7 +778,7 @@
           <a:p>
             <a:fld id="{A441B319-3D56-624A-B72E-F3B10B247E99}" type="datetimeFigureOut">
               <a:rPr kumimoji="1" lang="ko-Kore-KR" altLang="en-US" smtClean="0"/>
-              <a:t>2020. 8. 24.</a:t>
+              <a:t>09/24/2020</a:t>
             </a:fld>
             <a:endParaRPr kumimoji="1" lang="ko-Kore-KR" altLang="en-US"/>
           </a:p>
@@ -863,7 +948,7 @@
           <a:p>
             <a:fld id="{A441B319-3D56-624A-B72E-F3B10B247E99}" type="datetimeFigureOut">
               <a:rPr kumimoji="1" lang="ko-Kore-KR" altLang="en-US" smtClean="0"/>
-              <a:t>2020. 8. 24.</a:t>
+              <a:t>09/24/2020</a:t>
             </a:fld>
             <a:endParaRPr kumimoji="1" lang="ko-Kore-KR" altLang="en-US"/>
           </a:p>
@@ -1043,7 +1128,7 @@
           <a:p>
             <a:fld id="{A441B319-3D56-624A-B72E-F3B10B247E99}" type="datetimeFigureOut">
               <a:rPr kumimoji="1" lang="ko-Kore-KR" altLang="en-US" smtClean="0"/>
-              <a:t>2020. 8. 24.</a:t>
+              <a:t>09/24/2020</a:t>
             </a:fld>
             <a:endParaRPr kumimoji="1" lang="ko-Kore-KR" altLang="en-US"/>
           </a:p>
@@ -1213,7 +1298,7 @@
           <a:p>
             <a:fld id="{A441B319-3D56-624A-B72E-F3B10B247E99}" type="datetimeFigureOut">
               <a:rPr kumimoji="1" lang="ko-Kore-KR" altLang="en-US" smtClean="0"/>
-              <a:t>2020. 8. 24.</a:t>
+              <a:t>09/24/2020</a:t>
             </a:fld>
             <a:endParaRPr kumimoji="1" lang="ko-Kore-KR" altLang="en-US"/>
           </a:p>
@@ -1457,7 +1542,7 @@
           <a:p>
             <a:fld id="{A441B319-3D56-624A-B72E-F3B10B247E99}" type="datetimeFigureOut">
               <a:rPr kumimoji="1" lang="ko-Kore-KR" altLang="en-US" smtClean="0"/>
-              <a:t>2020. 8. 24.</a:t>
+              <a:t>09/24/2020</a:t>
             </a:fld>
             <a:endParaRPr kumimoji="1" lang="ko-Kore-KR" altLang="en-US"/>
           </a:p>
@@ -1689,7 +1774,7 @@
           <a:p>
             <a:fld id="{A441B319-3D56-624A-B72E-F3B10B247E99}" type="datetimeFigureOut">
               <a:rPr kumimoji="1" lang="ko-Kore-KR" altLang="en-US" smtClean="0"/>
-              <a:t>2020. 8. 24.</a:t>
+              <a:t>09/24/2020</a:t>
             </a:fld>
             <a:endParaRPr kumimoji="1" lang="ko-Kore-KR" altLang="en-US"/>
           </a:p>
@@ -2056,7 +2141,7 @@
           <a:p>
             <a:fld id="{A441B319-3D56-624A-B72E-F3B10B247E99}" type="datetimeFigureOut">
               <a:rPr kumimoji="1" lang="ko-Kore-KR" altLang="en-US" smtClean="0"/>
-              <a:t>2020. 8. 24.</a:t>
+              <a:t>09/24/2020</a:t>
             </a:fld>
             <a:endParaRPr kumimoji="1" lang="ko-Kore-KR" altLang="en-US"/>
           </a:p>
@@ -2174,7 +2259,7 @@
           <a:p>
             <a:fld id="{A441B319-3D56-624A-B72E-F3B10B247E99}" type="datetimeFigureOut">
               <a:rPr kumimoji="1" lang="ko-Kore-KR" altLang="en-US" smtClean="0"/>
-              <a:t>2020. 8. 24.</a:t>
+              <a:t>09/24/2020</a:t>
             </a:fld>
             <a:endParaRPr kumimoji="1" lang="ko-Kore-KR" altLang="en-US"/>
           </a:p>
@@ -2269,7 +2354,7 @@
           <a:p>
             <a:fld id="{A441B319-3D56-624A-B72E-F3B10B247E99}" type="datetimeFigureOut">
               <a:rPr kumimoji="1" lang="ko-Kore-KR" altLang="en-US" smtClean="0"/>
-              <a:t>2020. 8. 24.</a:t>
+              <a:t>09/24/2020</a:t>
             </a:fld>
             <a:endParaRPr kumimoji="1" lang="ko-Kore-KR" altLang="en-US"/>
           </a:p>
@@ -2546,7 +2631,7 @@
           <a:p>
             <a:fld id="{A441B319-3D56-624A-B72E-F3B10B247E99}" type="datetimeFigureOut">
               <a:rPr kumimoji="1" lang="ko-Kore-KR" altLang="en-US" smtClean="0"/>
-              <a:t>2020. 8. 24.</a:t>
+              <a:t>09/24/2020</a:t>
             </a:fld>
             <a:endParaRPr kumimoji="1" lang="ko-Kore-KR" altLang="en-US"/>
           </a:p>
@@ -2803,7 +2888,7 @@
           <a:p>
             <a:fld id="{A441B319-3D56-624A-B72E-F3B10B247E99}" type="datetimeFigureOut">
               <a:rPr kumimoji="1" lang="ko-Kore-KR" altLang="en-US" smtClean="0"/>
-              <a:t>2020. 8. 24.</a:t>
+              <a:t>09/24/2020</a:t>
             </a:fld>
             <a:endParaRPr kumimoji="1" lang="ko-Kore-KR" altLang="en-US"/>
           </a:p>
@@ -3016,7 +3101,7 @@
           <a:p>
             <a:fld id="{A441B319-3D56-624A-B72E-F3B10B247E99}" type="datetimeFigureOut">
               <a:rPr kumimoji="1" lang="ko-Kore-KR" altLang="en-US" smtClean="0"/>
-              <a:t>2020. 8. 24.</a:t>
+              <a:t>09/24/2020</a:t>
             </a:fld>
             <a:endParaRPr kumimoji="1" lang="ko-Kore-KR" altLang="en-US"/>
           </a:p>
@@ -11340,6 +11425,1815 @@
     <p:extLst>
       <p:ext uri="{BB962C8B-B14F-4D97-AF65-F5344CB8AC3E}">
         <p14:creationId xmlns:p14="http://schemas.microsoft.com/office/powerpoint/2010/main" val="3076288508"/>
+      </p:ext>
+    </p:extLst>
+  </p:cSld>
+  <p:clrMapOvr>
+    <a:masterClrMapping/>
+  </p:clrMapOvr>
+</p:sld>
+</file>
+
+<file path=ppt/slides/slide3.xml><?xml version="1.0" encoding="utf-8"?>
+<p:sld xmlns:a="http://schemas.openxmlformats.org/drawingml/2006/main" xmlns:r="http://schemas.openxmlformats.org/officeDocument/2006/relationships" xmlns:p="http://schemas.openxmlformats.org/presentationml/2006/main">
+  <p:cSld>
+    <p:spTree>
+      <p:nvGrpSpPr>
+        <p:cNvPr id="1" name=""/>
+        <p:cNvGrpSpPr/>
+        <p:nvPr/>
+      </p:nvGrpSpPr>
+      <p:grpSpPr>
+        <a:xfrm>
+          <a:off x="0" y="0"/>
+          <a:ext cx="0" cy="0"/>
+          <a:chOff x="0" y="0"/>
+          <a:chExt cx="0" cy="0"/>
+        </a:xfrm>
+      </p:grpSpPr>
+      <p:sp>
+        <p:nvSpPr>
+          <p:cNvPr id="179" name="문서 31">
+            <a:extLst>
+              <a:ext uri="{FF2B5EF4-FFF2-40B4-BE49-F238E27FC236}">
+                <a16:creationId xmlns:a16="http://schemas.microsoft.com/office/drawing/2014/main" id="{4ED6B696-9ED6-4F9E-84FC-C9344EA1AA0E}"/>
+              </a:ext>
+            </a:extLst>
+          </p:cNvPr>
+          <p:cNvSpPr/>
+          <p:nvPr/>
+        </p:nvSpPr>
+        <p:spPr>
+          <a:xfrm>
+            <a:off x="571935" y="3830937"/>
+            <a:ext cx="513392" cy="334316"/>
+          </a:xfrm>
+          <a:prstGeom prst="flowChartDocument">
+            <a:avLst/>
+          </a:prstGeom>
+          <a:noFill/>
+          <a:ln w="10160">
+            <a:solidFill>
+              <a:schemeClr val="tx1"/>
+            </a:solidFill>
+          </a:ln>
+        </p:spPr>
+        <p:style>
+          <a:lnRef idx="2">
+            <a:schemeClr val="accent1">
+              <a:shade val="50000"/>
+            </a:schemeClr>
+          </a:lnRef>
+          <a:fillRef idx="1">
+            <a:schemeClr val="accent1"/>
+          </a:fillRef>
+          <a:effectRef idx="0">
+            <a:schemeClr val="accent1"/>
+          </a:effectRef>
+          <a:fontRef idx="minor">
+            <a:schemeClr val="lt1"/>
+          </a:fontRef>
+        </p:style>
+        <p:txBody>
+          <a:bodyPr rtlCol="0" anchor="ctr"/>
+          <a:lstStyle/>
+          <a:p>
+            <a:pPr algn="ctr"/>
+            <a:r>
+              <a:rPr kumimoji="1" lang="en-US" altLang="ko-Kore-KR" sz="1200" dirty="0">
+                <a:solidFill>
+                  <a:schemeClr val="tx1"/>
+                </a:solidFill>
+              </a:rPr>
+              <a:t>DAM</a:t>
+            </a:r>
+            <a:endParaRPr kumimoji="1" lang="ko-Kore-KR" altLang="en-US" sz="1200" dirty="0">
+              <a:solidFill>
+                <a:schemeClr val="tx1"/>
+              </a:solidFill>
+            </a:endParaRPr>
+          </a:p>
+        </p:txBody>
+      </p:sp>
+      <p:sp>
+        <p:nvSpPr>
+          <p:cNvPr id="174" name="모서리가 둥근 직사각형 14">
+            <a:extLst>
+              <a:ext uri="{FF2B5EF4-FFF2-40B4-BE49-F238E27FC236}">
+                <a16:creationId xmlns:a16="http://schemas.microsoft.com/office/drawing/2014/main" id="{DFE00D88-2ED8-494F-AF11-58DB19224750}"/>
+              </a:ext>
+            </a:extLst>
+          </p:cNvPr>
+          <p:cNvSpPr/>
+          <p:nvPr/>
+        </p:nvSpPr>
+        <p:spPr>
+          <a:xfrm>
+            <a:off x="1640390" y="1991723"/>
+            <a:ext cx="5135160" cy="2878808"/>
+          </a:xfrm>
+          <a:prstGeom prst="roundRect">
+            <a:avLst>
+              <a:gd name="adj" fmla="val 5929"/>
+            </a:avLst>
+          </a:prstGeom>
+          <a:ln w="10160">
+            <a:solidFill>
+              <a:schemeClr val="tx1">
+                <a:lumMod val="50000"/>
+                <a:lumOff val="50000"/>
+              </a:schemeClr>
+            </a:solidFill>
+          </a:ln>
+          <a:effectLst/>
+        </p:spPr>
+        <p:style>
+          <a:lnRef idx="2">
+            <a:schemeClr val="accent6"/>
+          </a:lnRef>
+          <a:fillRef idx="1">
+            <a:schemeClr val="lt1"/>
+          </a:fillRef>
+          <a:effectRef idx="0">
+            <a:schemeClr val="accent6"/>
+          </a:effectRef>
+          <a:fontRef idx="minor">
+            <a:schemeClr val="dk1"/>
+          </a:fontRef>
+        </p:style>
+        <p:txBody>
+          <a:bodyPr rtlCol="0" anchor="ctr"/>
+          <a:lstStyle/>
+          <a:p>
+            <a:pPr algn="ctr"/>
+            <a:endParaRPr kumimoji="1" lang="ko-Kore-KR" altLang="en-US" dirty="0"/>
+          </a:p>
+        </p:txBody>
+      </p:sp>
+      <p:pic>
+        <p:nvPicPr>
+          <p:cNvPr id="19" name="그림 18" descr="그리기이(가) 표시된 사진&#10;&#10;자동 생성된 설명">
+            <a:extLst>
+              <a:ext uri="{FF2B5EF4-FFF2-40B4-BE49-F238E27FC236}">
+                <a16:creationId xmlns:a16="http://schemas.microsoft.com/office/drawing/2014/main" id="{B44A51EB-AC25-4765-8BC5-E89C9A64F993}"/>
+              </a:ext>
+            </a:extLst>
+          </p:cNvPr>
+          <p:cNvPicPr>
+            <a:picLocks noChangeAspect="1"/>
+          </p:cNvPicPr>
+          <p:nvPr/>
+        </p:nvPicPr>
+        <p:blipFill>
+          <a:blip r:embed="rId3"/>
+          <a:stretch>
+            <a:fillRect/>
+          </a:stretch>
+        </p:blipFill>
+        <p:spPr>
+          <a:xfrm>
+            <a:off x="358558" y="779425"/>
+            <a:ext cx="540000" cy="540000"/>
+          </a:xfrm>
+          <a:prstGeom prst="rect">
+            <a:avLst/>
+          </a:prstGeom>
+          <a:ln w="3175" cap="flat">
+            <a:solidFill>
+              <a:schemeClr val="bg2">
+                <a:lumMod val="90000"/>
+              </a:schemeClr>
+            </a:solidFill>
+          </a:ln>
+        </p:spPr>
+      </p:pic>
+      <p:cxnSp>
+        <p:nvCxnSpPr>
+          <p:cNvPr id="5" name="직선 연결선[R] 4">
+            <a:extLst>
+              <a:ext uri="{FF2B5EF4-FFF2-40B4-BE49-F238E27FC236}">
+                <a16:creationId xmlns:a16="http://schemas.microsoft.com/office/drawing/2014/main" id="{A1150F26-E61E-0541-BCDA-93853D45EBC7}"/>
+              </a:ext>
+            </a:extLst>
+          </p:cNvPr>
+          <p:cNvCxnSpPr>
+            <a:cxnSpLocks/>
+          </p:cNvCxnSpPr>
+          <p:nvPr/>
+        </p:nvCxnSpPr>
+        <p:spPr>
+          <a:xfrm>
+            <a:off x="150293" y="461783"/>
+            <a:ext cx="7993563" cy="0"/>
+          </a:xfrm>
+          <a:prstGeom prst="line">
+            <a:avLst/>
+          </a:prstGeom>
+          <a:ln w="25400"/>
+        </p:spPr>
+        <p:style>
+          <a:lnRef idx="1">
+            <a:schemeClr val="dk1"/>
+          </a:lnRef>
+          <a:fillRef idx="0">
+            <a:schemeClr val="dk1"/>
+          </a:fillRef>
+          <a:effectRef idx="0">
+            <a:schemeClr val="dk1"/>
+          </a:effectRef>
+          <a:fontRef idx="minor">
+            <a:schemeClr val="tx1"/>
+          </a:fontRef>
+        </p:style>
+      </p:cxnSp>
+      <p:sp>
+        <p:nvSpPr>
+          <p:cNvPr id="7" name="TextBox 6">
+            <a:extLst>
+              <a:ext uri="{FF2B5EF4-FFF2-40B4-BE49-F238E27FC236}">
+                <a16:creationId xmlns:a16="http://schemas.microsoft.com/office/drawing/2014/main" id="{D1C97DA1-5972-F24A-8D05-132F1120EE15}"/>
+              </a:ext>
+            </a:extLst>
+          </p:cNvPr>
+          <p:cNvSpPr txBox="1"/>
+          <p:nvPr/>
+        </p:nvSpPr>
+        <p:spPr>
+          <a:xfrm>
+            <a:off x="50409" y="6875"/>
+            <a:ext cx="3594254" cy="369332"/>
+          </a:xfrm>
+          <a:prstGeom prst="rect">
+            <a:avLst/>
+          </a:prstGeom>
+          <a:noFill/>
+        </p:spPr>
+        <p:txBody>
+          <a:bodyPr wrap="none" rtlCol="0">
+            <a:spAutoFit/>
+          </a:bodyPr>
+          <a:lstStyle/>
+          <a:p>
+            <a:r>
+              <a:rPr kumimoji="1" lang="en-US" altLang="ko-Kore-KR" dirty="0">
+                <a:latin typeface="Impact" panose="020B0806030902050204" pitchFamily="34" charset="0"/>
+                <a:cs typeface="Baloo" panose="03080902040302020200" pitchFamily="66" charset="0"/>
+              </a:rPr>
+              <a:t>Architecture Design of the Capstone</a:t>
+            </a:r>
+            <a:endParaRPr kumimoji="1" lang="ko-Kore-KR" altLang="en-US" dirty="0">
+              <a:latin typeface="Impact" panose="020B0806030902050204" pitchFamily="34" charset="0"/>
+              <a:cs typeface="Baloo" panose="03080902040302020200" pitchFamily="66" charset="0"/>
+            </a:endParaRPr>
+          </a:p>
+        </p:txBody>
+      </p:sp>
+      <p:sp>
+        <p:nvSpPr>
+          <p:cNvPr id="8" name="TextBox 7">
+            <a:extLst>
+              <a:ext uri="{FF2B5EF4-FFF2-40B4-BE49-F238E27FC236}">
+                <a16:creationId xmlns:a16="http://schemas.microsoft.com/office/drawing/2014/main" id="{B7E90BFD-4A19-ED45-A026-998A569C16F3}"/>
+              </a:ext>
+            </a:extLst>
+          </p:cNvPr>
+          <p:cNvSpPr txBox="1"/>
+          <p:nvPr/>
+        </p:nvSpPr>
+        <p:spPr>
+          <a:xfrm>
+            <a:off x="43927" y="267527"/>
+            <a:ext cx="2624436" cy="200055"/>
+          </a:xfrm>
+          <a:prstGeom prst="rect">
+            <a:avLst/>
+          </a:prstGeom>
+          <a:noFill/>
+        </p:spPr>
+        <p:txBody>
+          <a:bodyPr wrap="none" rtlCol="0">
+            <a:spAutoFit/>
+          </a:bodyPr>
+          <a:lstStyle/>
+          <a:p>
+            <a:r>
+              <a:rPr kumimoji="1" lang="en-US" altLang="ko-Kore-KR" sz="700" dirty="0">
+                <a:latin typeface="Batang" panose="02030600000101010101" pitchFamily="18" charset="-127"/>
+                <a:ea typeface="Batang" panose="02030600000101010101" pitchFamily="18" charset="-127"/>
+              </a:rPr>
+              <a:t>Real-time data visualization using distributed processing</a:t>
+            </a:r>
+            <a:endParaRPr kumimoji="1" lang="ko-Kore-KR" altLang="en-US" sz="700" dirty="0">
+              <a:latin typeface="Batang" panose="02030600000101010101" pitchFamily="18" charset="-127"/>
+              <a:ea typeface="Batang" panose="02030600000101010101" pitchFamily="18" charset="-127"/>
+            </a:endParaRPr>
+          </a:p>
+        </p:txBody>
+      </p:sp>
+      <p:sp>
+        <p:nvSpPr>
+          <p:cNvPr id="17" name="TextBox 16">
+            <a:extLst>
+              <a:ext uri="{FF2B5EF4-FFF2-40B4-BE49-F238E27FC236}">
+                <a16:creationId xmlns:a16="http://schemas.microsoft.com/office/drawing/2014/main" id="{3D4CF7BB-21C7-BC43-9EAE-DB7DC920E8EF}"/>
+              </a:ext>
+            </a:extLst>
+          </p:cNvPr>
+          <p:cNvSpPr txBox="1"/>
+          <p:nvPr/>
+        </p:nvSpPr>
+        <p:spPr>
+          <a:xfrm>
+            <a:off x="5743204" y="5022864"/>
+            <a:ext cx="2517036" cy="338554"/>
+          </a:xfrm>
+          <a:prstGeom prst="rect">
+            <a:avLst/>
+          </a:prstGeom>
+          <a:noFill/>
+        </p:spPr>
+        <p:txBody>
+          <a:bodyPr wrap="none" rtlCol="0">
+            <a:spAutoFit/>
+          </a:bodyPr>
+          <a:lstStyle/>
+          <a:p>
+            <a:r>
+              <a:rPr kumimoji="1" lang="en-US" altLang="ko-Kore-KR" sz="800" dirty="0"/>
+              <a:t>Crew : Kim-</a:t>
+            </a:r>
+            <a:r>
+              <a:rPr kumimoji="1" lang="en-US" altLang="ko-Kore-KR" sz="800" dirty="0" err="1"/>
+              <a:t>DongGyu</a:t>
+            </a:r>
+            <a:r>
+              <a:rPr kumimoji="1" lang="en-US" altLang="ko-Kore-KR" sz="800" dirty="0"/>
+              <a:t> / Park-</a:t>
+            </a:r>
+            <a:r>
+              <a:rPr kumimoji="1" lang="en-US" altLang="ko-Kore-KR" sz="800" dirty="0" err="1"/>
+              <a:t>HyeonJun</a:t>
+            </a:r>
+            <a:r>
+              <a:rPr kumimoji="1" lang="en-US" altLang="ko-Kore-KR" sz="800" dirty="0"/>
+              <a:t> / Bae-</a:t>
+            </a:r>
+            <a:r>
+              <a:rPr kumimoji="1" lang="en-US" altLang="ko-Kore-KR" sz="800" dirty="0" err="1"/>
+              <a:t>SeongHoon</a:t>
+            </a:r>
+            <a:endParaRPr kumimoji="1" lang="en-US" altLang="ko-Kore-KR" sz="800" dirty="0"/>
+          </a:p>
+          <a:p>
+            <a:r>
+              <a:rPr kumimoji="1" lang="en-US" altLang="ko-Kore-KR" sz="800" dirty="0" err="1"/>
+              <a:t>Github</a:t>
+            </a:r>
+            <a:r>
+              <a:rPr kumimoji="1" lang="en-US" altLang="ko-Kore-KR" sz="800" dirty="0"/>
+              <a:t> : https://</a:t>
+            </a:r>
+            <a:r>
+              <a:rPr kumimoji="1" lang="en-US" altLang="ko-Kore-KR" sz="800" dirty="0" err="1"/>
+              <a:t>github.com</a:t>
+            </a:r>
+            <a:r>
+              <a:rPr kumimoji="1" lang="en-US" altLang="ko-Kore-KR" sz="800" dirty="0"/>
+              <a:t>/</a:t>
+            </a:r>
+            <a:r>
+              <a:rPr kumimoji="1" lang="en-US" altLang="ko-Kore-KR" sz="800" dirty="0" err="1"/>
+              <a:t>CapstoneTeam</a:t>
+            </a:r>
+            <a:r>
+              <a:rPr kumimoji="1" lang="en-US" altLang="ko-Kore-KR" sz="800" dirty="0"/>
+              <a:t>-CESCO</a:t>
+            </a:r>
+            <a:endParaRPr kumimoji="1" lang="ko-Kore-KR" altLang="en-US" sz="800" dirty="0"/>
+          </a:p>
+        </p:txBody>
+      </p:sp>
+      <p:sp>
+        <p:nvSpPr>
+          <p:cNvPr id="149" name="TextBox 148">
+            <a:extLst>
+              <a:ext uri="{FF2B5EF4-FFF2-40B4-BE49-F238E27FC236}">
+                <a16:creationId xmlns:a16="http://schemas.microsoft.com/office/drawing/2014/main" id="{29D7C74C-0124-4393-97E1-BE17EFEB8DDD}"/>
+              </a:ext>
+            </a:extLst>
+          </p:cNvPr>
+          <p:cNvSpPr txBox="1"/>
+          <p:nvPr/>
+        </p:nvSpPr>
+        <p:spPr>
+          <a:xfrm>
+            <a:off x="253818" y="648620"/>
+            <a:ext cx="487935" cy="261610"/>
+          </a:xfrm>
+          <a:prstGeom prst="rect">
+            <a:avLst/>
+          </a:prstGeom>
+          <a:solidFill>
+            <a:schemeClr val="lt1"/>
+          </a:solidFill>
+        </p:spPr>
+        <p:txBody>
+          <a:bodyPr wrap="square" lIns="36000" rIns="36000" rtlCol="0">
+            <a:spAutoFit/>
+          </a:bodyPr>
+          <a:lstStyle/>
+          <a:p>
+            <a:r>
+              <a:rPr kumimoji="1" lang="en-US" altLang="en-US" sz="1100" dirty="0">
+                <a:solidFill>
+                  <a:schemeClr val="bg1">
+                    <a:lumMod val="65000"/>
+                  </a:schemeClr>
+                </a:solidFill>
+                <a:latin typeface="Arial Unicode MS" panose="020B0604020202020204" pitchFamily="34" charset="-128"/>
+                <a:ea typeface="Arial Unicode MS" panose="020B0604020202020204" pitchFamily="34" charset="-128"/>
+                <a:cs typeface="Arial Unicode MS" panose="020B0604020202020204" pitchFamily="34" charset="-128"/>
+              </a:rPr>
+              <a:t>Local</a:t>
+            </a:r>
+            <a:endParaRPr kumimoji="1" lang="ko-Kore-KR" altLang="en-US" sz="1100" dirty="0">
+              <a:solidFill>
+                <a:schemeClr val="bg1">
+                  <a:lumMod val="65000"/>
+                </a:schemeClr>
+              </a:solidFill>
+              <a:latin typeface="Arial Unicode MS" panose="020B0604020202020204" pitchFamily="34" charset="-128"/>
+              <a:ea typeface="Arial Unicode MS" panose="020B0604020202020204" pitchFamily="34" charset="-128"/>
+              <a:cs typeface="Arial Unicode MS" panose="020B0604020202020204" pitchFamily="34" charset="-128"/>
+            </a:endParaRPr>
+          </a:p>
+        </p:txBody>
+      </p:sp>
+      <p:pic>
+        <p:nvPicPr>
+          <p:cNvPr id="6" name="그림 5" descr="그리기이(가) 표시된 사진&#10;&#10;자동 생성된 설명">
+            <a:extLst>
+              <a:ext uri="{FF2B5EF4-FFF2-40B4-BE49-F238E27FC236}">
+                <a16:creationId xmlns:a16="http://schemas.microsoft.com/office/drawing/2014/main" id="{9B53D843-CB4E-4E2E-AA09-45C233B4E247}"/>
+              </a:ext>
+            </a:extLst>
+          </p:cNvPr>
+          <p:cNvPicPr>
+            <a:picLocks noChangeAspect="1"/>
+          </p:cNvPicPr>
+          <p:nvPr/>
+        </p:nvPicPr>
+        <p:blipFill>
+          <a:blip r:embed="rId4"/>
+          <a:stretch>
+            <a:fillRect/>
+          </a:stretch>
+        </p:blipFill>
+        <p:spPr>
+          <a:xfrm>
+            <a:off x="5647718" y="783071"/>
+            <a:ext cx="1341270" cy="540000"/>
+          </a:xfrm>
+          <a:prstGeom prst="rect">
+            <a:avLst/>
+          </a:prstGeom>
+          <a:ln w="3175">
+            <a:solidFill>
+              <a:schemeClr val="bg2">
+                <a:lumMod val="90000"/>
+              </a:schemeClr>
+            </a:solidFill>
+          </a:ln>
+        </p:spPr>
+      </p:pic>
+      <p:pic>
+        <p:nvPicPr>
+          <p:cNvPr id="10" name="그림 9" descr="그리기, 테이블이(가) 표시된 사진&#10;&#10;자동 생성된 설명">
+            <a:extLst>
+              <a:ext uri="{FF2B5EF4-FFF2-40B4-BE49-F238E27FC236}">
+                <a16:creationId xmlns:a16="http://schemas.microsoft.com/office/drawing/2014/main" id="{3DF9B3FB-6EF4-49B6-B3E6-8C3164A4C997}"/>
+              </a:ext>
+            </a:extLst>
+          </p:cNvPr>
+          <p:cNvPicPr>
+            <a:picLocks noChangeAspect="1"/>
+          </p:cNvPicPr>
+          <p:nvPr/>
+        </p:nvPicPr>
+        <p:blipFill>
+          <a:blip r:embed="rId5"/>
+          <a:stretch>
+            <a:fillRect/>
+          </a:stretch>
+        </p:blipFill>
+        <p:spPr>
+          <a:xfrm>
+            <a:off x="1356145" y="779425"/>
+            <a:ext cx="834545" cy="540000"/>
+          </a:xfrm>
+          <a:prstGeom prst="rect">
+            <a:avLst/>
+          </a:prstGeom>
+          <a:ln w="3175">
+            <a:solidFill>
+              <a:schemeClr val="bg2">
+                <a:lumMod val="90000"/>
+              </a:schemeClr>
+            </a:solidFill>
+          </a:ln>
+        </p:spPr>
+      </p:pic>
+      <p:pic>
+        <p:nvPicPr>
+          <p:cNvPr id="23" name="그림 22" descr="그리기이(가) 표시된 사진&#10;&#10;자동 생성된 설명">
+            <a:extLst>
+              <a:ext uri="{FF2B5EF4-FFF2-40B4-BE49-F238E27FC236}">
+                <a16:creationId xmlns:a16="http://schemas.microsoft.com/office/drawing/2014/main" id="{2A43A751-C3F8-413A-8F8B-95FD356C09B4}"/>
+              </a:ext>
+            </a:extLst>
+          </p:cNvPr>
+          <p:cNvPicPr>
+            <a:picLocks noChangeAspect="1"/>
+          </p:cNvPicPr>
+          <p:nvPr/>
+        </p:nvPicPr>
+        <p:blipFill>
+          <a:blip r:embed="rId6"/>
+          <a:stretch>
+            <a:fillRect/>
+          </a:stretch>
+        </p:blipFill>
+        <p:spPr>
+          <a:xfrm>
+            <a:off x="2613029" y="783071"/>
+            <a:ext cx="1080000" cy="540000"/>
+          </a:xfrm>
+          <a:prstGeom prst="rect">
+            <a:avLst/>
+          </a:prstGeom>
+          <a:ln w="3175">
+            <a:solidFill>
+              <a:schemeClr val="bg2">
+                <a:lumMod val="90000"/>
+              </a:schemeClr>
+            </a:solidFill>
+          </a:ln>
+        </p:spPr>
+      </p:pic>
+      <p:pic>
+        <p:nvPicPr>
+          <p:cNvPr id="31" name="그림 30">
+            <a:extLst>
+              <a:ext uri="{FF2B5EF4-FFF2-40B4-BE49-F238E27FC236}">
+                <a16:creationId xmlns:a16="http://schemas.microsoft.com/office/drawing/2014/main" id="{5912DD43-88D4-4119-A30C-3C3AB2E28F6D}"/>
+              </a:ext>
+            </a:extLst>
+          </p:cNvPr>
+          <p:cNvPicPr>
+            <a:picLocks noChangeAspect="1"/>
+          </p:cNvPicPr>
+          <p:nvPr/>
+        </p:nvPicPr>
+        <p:blipFill>
+          <a:blip r:embed="rId7"/>
+          <a:stretch>
+            <a:fillRect/>
+          </a:stretch>
+        </p:blipFill>
+        <p:spPr>
+          <a:xfrm>
+            <a:off x="4150879" y="783071"/>
+            <a:ext cx="1037999" cy="540000"/>
+          </a:xfrm>
+          <a:prstGeom prst="rect">
+            <a:avLst/>
+          </a:prstGeom>
+          <a:ln w="3175">
+            <a:solidFill>
+              <a:schemeClr val="bg2">
+                <a:lumMod val="90000"/>
+              </a:schemeClr>
+            </a:solidFill>
+          </a:ln>
+        </p:spPr>
+      </p:pic>
+      <p:pic>
+        <p:nvPicPr>
+          <p:cNvPr id="47" name="그림 46">
+            <a:extLst>
+              <a:ext uri="{FF2B5EF4-FFF2-40B4-BE49-F238E27FC236}">
+                <a16:creationId xmlns:a16="http://schemas.microsoft.com/office/drawing/2014/main" id="{9027B6F5-3104-4620-BB6E-A83DFD01409F}"/>
+              </a:ext>
+            </a:extLst>
+          </p:cNvPr>
+          <p:cNvPicPr>
+            <a:picLocks noChangeAspect="1"/>
+          </p:cNvPicPr>
+          <p:nvPr/>
+        </p:nvPicPr>
+        <p:blipFill>
+          <a:blip r:embed="rId8"/>
+          <a:stretch>
+            <a:fillRect/>
+          </a:stretch>
+        </p:blipFill>
+        <p:spPr>
+          <a:xfrm>
+            <a:off x="3080997" y="4093146"/>
+            <a:ext cx="894938" cy="298313"/>
+          </a:xfrm>
+          <a:prstGeom prst="rect">
+            <a:avLst/>
+          </a:prstGeom>
+          <a:ln w="12700">
+            <a:solidFill>
+              <a:schemeClr val="tx1"/>
+            </a:solidFill>
+          </a:ln>
+        </p:spPr>
+      </p:pic>
+      <p:sp>
+        <p:nvSpPr>
+          <p:cNvPr id="177" name="TextBox 176">
+            <a:extLst>
+              <a:ext uri="{FF2B5EF4-FFF2-40B4-BE49-F238E27FC236}">
+                <a16:creationId xmlns:a16="http://schemas.microsoft.com/office/drawing/2014/main" id="{BB60CE8A-9081-4E08-9E59-40CE357114D2}"/>
+              </a:ext>
+            </a:extLst>
+          </p:cNvPr>
+          <p:cNvSpPr txBox="1"/>
+          <p:nvPr/>
+        </p:nvSpPr>
+        <p:spPr>
+          <a:xfrm>
+            <a:off x="396222" y="3569327"/>
+            <a:ext cx="873957" cy="261610"/>
+          </a:xfrm>
+          <a:prstGeom prst="rect">
+            <a:avLst/>
+          </a:prstGeom>
+          <a:noFill/>
+        </p:spPr>
+        <p:txBody>
+          <a:bodyPr wrap="none" rtlCol="0">
+            <a:spAutoFit/>
+          </a:bodyPr>
+          <a:lstStyle/>
+          <a:p>
+            <a:r>
+              <a:rPr kumimoji="1" lang="en-US" altLang="ko-Kore-KR" sz="1100" dirty="0">
+                <a:solidFill>
+                  <a:schemeClr val="bg1">
+                    <a:lumMod val="65000"/>
+                  </a:schemeClr>
+                </a:solidFill>
+                <a:latin typeface="Arial Unicode MS" panose="020B0604020202020204" pitchFamily="34" charset="-128"/>
+                <a:ea typeface="Arial Unicode MS" panose="020B0604020202020204" pitchFamily="34" charset="-128"/>
+                <a:cs typeface="Arial Unicode MS" panose="020B0604020202020204" pitchFamily="34" charset="-128"/>
+              </a:rPr>
+              <a:t>Data Layer</a:t>
+            </a:r>
+            <a:endParaRPr kumimoji="1" lang="ko-Kore-KR" altLang="en-US" sz="1100" dirty="0">
+              <a:solidFill>
+                <a:schemeClr val="bg1">
+                  <a:lumMod val="65000"/>
+                </a:schemeClr>
+              </a:solidFill>
+              <a:latin typeface="Arial Unicode MS" panose="020B0604020202020204" pitchFamily="34" charset="-128"/>
+              <a:ea typeface="Arial Unicode MS" panose="020B0604020202020204" pitchFamily="34" charset="-128"/>
+              <a:cs typeface="Arial Unicode MS" panose="020B0604020202020204" pitchFamily="34" charset="-128"/>
+            </a:endParaRPr>
+          </a:p>
+        </p:txBody>
+      </p:sp>
+      <p:pic>
+        <p:nvPicPr>
+          <p:cNvPr id="55" name="그림 54">
+            <a:extLst>
+              <a:ext uri="{FF2B5EF4-FFF2-40B4-BE49-F238E27FC236}">
+                <a16:creationId xmlns:a16="http://schemas.microsoft.com/office/drawing/2014/main" id="{080FEC38-8C75-4F98-B3DA-BB9F853F1436}"/>
+              </a:ext>
+            </a:extLst>
+          </p:cNvPr>
+          <p:cNvPicPr>
+            <a:picLocks noChangeAspect="1"/>
+          </p:cNvPicPr>
+          <p:nvPr/>
+        </p:nvPicPr>
+        <p:blipFill>
+          <a:blip r:embed="rId9"/>
+          <a:stretch>
+            <a:fillRect/>
+          </a:stretch>
+        </p:blipFill>
+        <p:spPr>
+          <a:xfrm>
+            <a:off x="4312546" y="2539926"/>
+            <a:ext cx="911368" cy="866250"/>
+          </a:xfrm>
+          <a:prstGeom prst="rect">
+            <a:avLst/>
+          </a:prstGeom>
+          <a:ln w="3175">
+            <a:solidFill>
+              <a:schemeClr val="bg2">
+                <a:lumMod val="90000"/>
+              </a:schemeClr>
+            </a:solidFill>
+          </a:ln>
+        </p:spPr>
+      </p:pic>
+      <p:pic>
+        <p:nvPicPr>
+          <p:cNvPr id="91" name="그림 90">
+            <a:extLst>
+              <a:ext uri="{FF2B5EF4-FFF2-40B4-BE49-F238E27FC236}">
+                <a16:creationId xmlns:a16="http://schemas.microsoft.com/office/drawing/2014/main" id="{7DAE32F7-10FB-4B9A-9878-CBE4628A3531}"/>
+              </a:ext>
+            </a:extLst>
+          </p:cNvPr>
+          <p:cNvPicPr>
+            <a:picLocks noChangeAspect="1"/>
+          </p:cNvPicPr>
+          <p:nvPr/>
+        </p:nvPicPr>
+        <p:blipFill>
+          <a:blip r:embed="rId10"/>
+          <a:stretch>
+            <a:fillRect/>
+          </a:stretch>
+        </p:blipFill>
+        <p:spPr>
+          <a:xfrm>
+            <a:off x="1838637" y="3025960"/>
+            <a:ext cx="930828" cy="514053"/>
+          </a:xfrm>
+          <a:prstGeom prst="rect">
+            <a:avLst/>
+          </a:prstGeom>
+        </p:spPr>
+      </p:pic>
+      <p:pic>
+        <p:nvPicPr>
+          <p:cNvPr id="82" name="그림 81" descr="그리기이(가) 표시된 사진&#10;&#10;자동 생성된 설명">
+            <a:extLst>
+              <a:ext uri="{FF2B5EF4-FFF2-40B4-BE49-F238E27FC236}">
+                <a16:creationId xmlns:a16="http://schemas.microsoft.com/office/drawing/2014/main" id="{BE5E91C4-C6DB-48D8-865E-7BD8B4BADA2B}"/>
+              </a:ext>
+            </a:extLst>
+          </p:cNvPr>
+          <p:cNvPicPr>
+            <a:picLocks noChangeAspect="1"/>
+          </p:cNvPicPr>
+          <p:nvPr/>
+        </p:nvPicPr>
+        <p:blipFill>
+          <a:blip r:embed="rId11"/>
+          <a:stretch>
+            <a:fillRect/>
+          </a:stretch>
+        </p:blipFill>
+        <p:spPr>
+          <a:xfrm>
+            <a:off x="4311975" y="3099503"/>
+            <a:ext cx="915160" cy="308350"/>
+          </a:xfrm>
+          <a:prstGeom prst="rect">
+            <a:avLst/>
+          </a:prstGeom>
+          <a:ln w="3175">
+            <a:solidFill>
+              <a:schemeClr val="bg2">
+                <a:lumMod val="90000"/>
+              </a:schemeClr>
+            </a:solidFill>
+          </a:ln>
+        </p:spPr>
+      </p:pic>
+      <p:pic>
+        <p:nvPicPr>
+          <p:cNvPr id="44" name="그림 43">
+            <a:extLst>
+              <a:ext uri="{FF2B5EF4-FFF2-40B4-BE49-F238E27FC236}">
+                <a16:creationId xmlns:a16="http://schemas.microsoft.com/office/drawing/2014/main" id="{A3BBCC46-3869-48CE-9C1F-5974BCC9BF91}"/>
+              </a:ext>
+            </a:extLst>
+          </p:cNvPr>
+          <p:cNvPicPr>
+            <a:picLocks noChangeAspect="1"/>
+          </p:cNvPicPr>
+          <p:nvPr/>
+        </p:nvPicPr>
+        <p:blipFill>
+          <a:blip r:embed="rId12"/>
+          <a:stretch>
+            <a:fillRect/>
+          </a:stretch>
+        </p:blipFill>
+        <p:spPr>
+          <a:xfrm>
+            <a:off x="1848626" y="3770440"/>
+            <a:ext cx="913556" cy="427901"/>
+          </a:xfrm>
+          <a:prstGeom prst="rect">
+            <a:avLst/>
+          </a:prstGeom>
+          <a:ln w="3175">
+            <a:solidFill>
+              <a:schemeClr val="bg2">
+                <a:lumMod val="90000"/>
+              </a:schemeClr>
+            </a:solidFill>
+          </a:ln>
+        </p:spPr>
+      </p:pic>
+      <p:pic>
+        <p:nvPicPr>
+          <p:cNvPr id="196" name="그림 195">
+            <a:extLst>
+              <a:ext uri="{FF2B5EF4-FFF2-40B4-BE49-F238E27FC236}">
+                <a16:creationId xmlns:a16="http://schemas.microsoft.com/office/drawing/2014/main" id="{B2A815D0-EF8A-47D9-9D8B-1209C7C35DA3}"/>
+              </a:ext>
+            </a:extLst>
+          </p:cNvPr>
+          <p:cNvPicPr>
+            <a:picLocks noChangeAspect="1"/>
+          </p:cNvPicPr>
+          <p:nvPr/>
+        </p:nvPicPr>
+        <p:blipFill>
+          <a:blip r:embed="rId10"/>
+          <a:stretch>
+            <a:fillRect/>
+          </a:stretch>
+        </p:blipFill>
+        <p:spPr>
+          <a:xfrm>
+            <a:off x="4292881" y="2073689"/>
+            <a:ext cx="930828" cy="514053"/>
+          </a:xfrm>
+          <a:prstGeom prst="rect">
+            <a:avLst/>
+          </a:prstGeom>
+        </p:spPr>
+      </p:pic>
+      <p:sp>
+        <p:nvSpPr>
+          <p:cNvPr id="93" name="직사각형 92">
+            <a:extLst>
+              <a:ext uri="{FF2B5EF4-FFF2-40B4-BE49-F238E27FC236}">
+                <a16:creationId xmlns:a16="http://schemas.microsoft.com/office/drawing/2014/main" id="{5DBB800D-D4F6-4F1C-BB09-407F74E0C61B}"/>
+              </a:ext>
+            </a:extLst>
+          </p:cNvPr>
+          <p:cNvSpPr/>
+          <p:nvPr/>
+        </p:nvSpPr>
+        <p:spPr>
+          <a:xfrm>
+            <a:off x="4300374" y="3404787"/>
+            <a:ext cx="930829" cy="380927"/>
+          </a:xfrm>
+          <a:prstGeom prst="rect">
+            <a:avLst/>
+          </a:prstGeom>
+          <a:ln w="3175">
+            <a:solidFill>
+              <a:schemeClr val="bg2">
+                <a:lumMod val="90000"/>
+              </a:schemeClr>
+            </a:solidFill>
+          </a:ln>
+        </p:spPr>
+        <p:style>
+          <a:lnRef idx="2">
+            <a:schemeClr val="accent6"/>
+          </a:lnRef>
+          <a:fillRef idx="1">
+            <a:schemeClr val="lt1"/>
+          </a:fillRef>
+          <a:effectRef idx="0">
+            <a:schemeClr val="accent6"/>
+          </a:effectRef>
+          <a:fontRef idx="minor">
+            <a:schemeClr val="dk1"/>
+          </a:fontRef>
+        </p:style>
+        <p:txBody>
+          <a:bodyPr rtlCol="0" anchor="ctr"/>
+          <a:lstStyle/>
+          <a:p>
+            <a:pPr algn="ctr"/>
+            <a:r>
+              <a:rPr lang="en-US" altLang="ko-KR" sz="1000" dirty="0"/>
+              <a:t>Kafka Consumer</a:t>
+            </a:r>
+            <a:endParaRPr lang="ko-KR" altLang="en-US" sz="1000" dirty="0"/>
+          </a:p>
+        </p:txBody>
+      </p:sp>
+      <p:sp>
+        <p:nvSpPr>
+          <p:cNvPr id="195" name="직사각형 194">
+            <a:extLst>
+              <a:ext uri="{FF2B5EF4-FFF2-40B4-BE49-F238E27FC236}">
+                <a16:creationId xmlns:a16="http://schemas.microsoft.com/office/drawing/2014/main" id="{97B62D1E-7579-4D65-B820-47D39AA6669F}"/>
+              </a:ext>
+            </a:extLst>
+          </p:cNvPr>
+          <p:cNvSpPr/>
+          <p:nvPr/>
+        </p:nvSpPr>
+        <p:spPr>
+          <a:xfrm>
+            <a:off x="4302408" y="2431175"/>
+            <a:ext cx="926759" cy="1362630"/>
+          </a:xfrm>
+          <a:prstGeom prst="rect">
+            <a:avLst/>
+          </a:prstGeom>
+          <a:noFill/>
+          <a:ln w="12700">
+            <a:solidFill>
+              <a:schemeClr val="tx1"/>
+            </a:solidFill>
+          </a:ln>
+        </p:spPr>
+        <p:style>
+          <a:lnRef idx="2">
+            <a:schemeClr val="accent6"/>
+          </a:lnRef>
+          <a:fillRef idx="1">
+            <a:schemeClr val="lt1"/>
+          </a:fillRef>
+          <a:effectRef idx="0">
+            <a:schemeClr val="accent6"/>
+          </a:effectRef>
+          <a:fontRef idx="minor">
+            <a:schemeClr val="dk1"/>
+          </a:fontRef>
+        </p:style>
+        <p:txBody>
+          <a:bodyPr rtlCol="0" anchor="ctr"/>
+          <a:lstStyle/>
+          <a:p>
+            <a:pPr algn="ctr"/>
+            <a:endParaRPr lang="ko-KR" altLang="en-US"/>
+          </a:p>
+        </p:txBody>
+      </p:sp>
+      <p:sp>
+        <p:nvSpPr>
+          <p:cNvPr id="194" name="모서리가 둥근 직사각형 65">
+            <a:extLst>
+              <a:ext uri="{FF2B5EF4-FFF2-40B4-BE49-F238E27FC236}">
+                <a16:creationId xmlns:a16="http://schemas.microsoft.com/office/drawing/2014/main" id="{506C7362-BB23-43D7-818F-78306BF7F805}"/>
+              </a:ext>
+            </a:extLst>
+          </p:cNvPr>
+          <p:cNvSpPr/>
+          <p:nvPr/>
+        </p:nvSpPr>
+        <p:spPr>
+          <a:xfrm>
+            <a:off x="1850814" y="3382666"/>
+            <a:ext cx="911368" cy="384666"/>
+          </a:xfrm>
+          <a:prstGeom prst="roundRect">
+            <a:avLst>
+              <a:gd name="adj" fmla="val 5929"/>
+            </a:avLst>
+          </a:prstGeom>
+          <a:ln w="3175">
+            <a:solidFill>
+              <a:schemeClr val="bg2">
+                <a:lumMod val="90000"/>
+              </a:schemeClr>
+            </a:solidFill>
+          </a:ln>
+          <a:effectLst/>
+        </p:spPr>
+        <p:style>
+          <a:lnRef idx="2">
+            <a:schemeClr val="accent6"/>
+          </a:lnRef>
+          <a:fillRef idx="1">
+            <a:schemeClr val="lt1"/>
+          </a:fillRef>
+          <a:effectRef idx="0">
+            <a:schemeClr val="accent6"/>
+          </a:effectRef>
+          <a:fontRef idx="minor">
+            <a:schemeClr val="dk1"/>
+          </a:fontRef>
+        </p:style>
+        <p:txBody>
+          <a:bodyPr tIns="0" bIns="0" rtlCol="0" anchor="ctr" anchorCtr="0"/>
+          <a:lstStyle/>
+          <a:p>
+            <a:pPr algn="ctr"/>
+            <a:r>
+              <a:rPr kumimoji="1" lang="en-US" altLang="ko-Kore-KR" sz="1000" dirty="0"/>
+              <a:t>Kafka Producer</a:t>
+            </a:r>
+            <a:endParaRPr kumimoji="1" lang="ko-Kore-KR" altLang="en-US" sz="1000" dirty="0"/>
+          </a:p>
+        </p:txBody>
+      </p:sp>
+      <p:sp>
+        <p:nvSpPr>
+          <p:cNvPr id="85" name="직사각형 84">
+            <a:extLst>
+              <a:ext uri="{FF2B5EF4-FFF2-40B4-BE49-F238E27FC236}">
+                <a16:creationId xmlns:a16="http://schemas.microsoft.com/office/drawing/2014/main" id="{E01C5D38-38E6-4979-B965-B4ED63FAB0D6}"/>
+              </a:ext>
+            </a:extLst>
+          </p:cNvPr>
+          <p:cNvSpPr/>
+          <p:nvPr/>
+        </p:nvSpPr>
+        <p:spPr>
+          <a:xfrm>
+            <a:off x="1844235" y="3382666"/>
+            <a:ext cx="926759" cy="812567"/>
+          </a:xfrm>
+          <a:prstGeom prst="rect">
+            <a:avLst/>
+          </a:prstGeom>
+          <a:noFill/>
+          <a:ln w="12700">
+            <a:solidFill>
+              <a:schemeClr val="tx1"/>
+            </a:solidFill>
+          </a:ln>
+        </p:spPr>
+        <p:style>
+          <a:lnRef idx="2">
+            <a:schemeClr val="accent6"/>
+          </a:lnRef>
+          <a:fillRef idx="1">
+            <a:schemeClr val="lt1"/>
+          </a:fillRef>
+          <a:effectRef idx="0">
+            <a:schemeClr val="accent6"/>
+          </a:effectRef>
+          <a:fontRef idx="minor">
+            <a:schemeClr val="dk1"/>
+          </a:fontRef>
+        </p:style>
+        <p:txBody>
+          <a:bodyPr rtlCol="0" anchor="ctr"/>
+          <a:lstStyle/>
+          <a:p>
+            <a:pPr algn="ctr"/>
+            <a:endParaRPr lang="ko-KR" altLang="en-US"/>
+          </a:p>
+        </p:txBody>
+      </p:sp>
+      <p:pic>
+        <p:nvPicPr>
+          <p:cNvPr id="98" name="그림 97" descr="음식이(가) 표시된 사진&#10;&#10;자동 생성된 설명">
+            <a:extLst>
+              <a:ext uri="{FF2B5EF4-FFF2-40B4-BE49-F238E27FC236}">
+                <a16:creationId xmlns:a16="http://schemas.microsoft.com/office/drawing/2014/main" id="{AC6777EB-73BA-40A5-AA1B-F4902E0042F1}"/>
+              </a:ext>
+            </a:extLst>
+          </p:cNvPr>
+          <p:cNvPicPr>
+            <a:picLocks noChangeAspect="1"/>
+          </p:cNvPicPr>
+          <p:nvPr/>
+        </p:nvPicPr>
+        <p:blipFill>
+          <a:blip r:embed="rId13"/>
+          <a:stretch>
+            <a:fillRect/>
+          </a:stretch>
+        </p:blipFill>
+        <p:spPr>
+          <a:xfrm>
+            <a:off x="6988988" y="2330715"/>
+            <a:ext cx="504000" cy="504000"/>
+          </a:xfrm>
+          <a:prstGeom prst="rect">
+            <a:avLst/>
+          </a:prstGeom>
+          <a:ln w="3175">
+            <a:solidFill>
+              <a:schemeClr val="bg2">
+                <a:lumMod val="90000"/>
+              </a:schemeClr>
+            </a:solidFill>
+          </a:ln>
+        </p:spPr>
+      </p:pic>
+      <p:pic>
+        <p:nvPicPr>
+          <p:cNvPr id="102" name="그림 101">
+            <a:extLst>
+              <a:ext uri="{FF2B5EF4-FFF2-40B4-BE49-F238E27FC236}">
+                <a16:creationId xmlns:a16="http://schemas.microsoft.com/office/drawing/2014/main" id="{5A460C63-D106-4427-9D6C-FCBE3D87DAC8}"/>
+              </a:ext>
+            </a:extLst>
+          </p:cNvPr>
+          <p:cNvPicPr>
+            <a:picLocks noChangeAspect="1"/>
+          </p:cNvPicPr>
+          <p:nvPr/>
+        </p:nvPicPr>
+        <p:blipFill>
+          <a:blip r:embed="rId14"/>
+          <a:stretch>
+            <a:fillRect/>
+          </a:stretch>
+        </p:blipFill>
+        <p:spPr>
+          <a:xfrm>
+            <a:off x="7011473" y="3048733"/>
+            <a:ext cx="504000" cy="504000"/>
+          </a:xfrm>
+          <a:prstGeom prst="rect">
+            <a:avLst/>
+          </a:prstGeom>
+          <a:ln w="3175">
+            <a:solidFill>
+              <a:schemeClr val="bg2">
+                <a:lumMod val="90000"/>
+              </a:schemeClr>
+            </a:solidFill>
+          </a:ln>
+        </p:spPr>
+      </p:pic>
+      <p:cxnSp>
+        <p:nvCxnSpPr>
+          <p:cNvPr id="106" name="직선 화살표 연결선 105">
+            <a:extLst>
+              <a:ext uri="{FF2B5EF4-FFF2-40B4-BE49-F238E27FC236}">
+                <a16:creationId xmlns:a16="http://schemas.microsoft.com/office/drawing/2014/main" id="{4F2A0A60-8A6F-4197-9060-4AD80F8F57AD}"/>
+              </a:ext>
+            </a:extLst>
+          </p:cNvPr>
+          <p:cNvCxnSpPr/>
+          <p:nvPr/>
+        </p:nvCxnSpPr>
+        <p:spPr>
+          <a:xfrm>
+            <a:off x="955149" y="1049425"/>
+            <a:ext cx="360000" cy="0"/>
+          </a:xfrm>
+          <a:prstGeom prst="straightConnector1">
+            <a:avLst/>
+          </a:prstGeom>
+          <a:ln w="9525">
+            <a:tailEnd type="triangle"/>
+          </a:ln>
+        </p:spPr>
+        <p:style>
+          <a:lnRef idx="1">
+            <a:schemeClr val="dk1"/>
+          </a:lnRef>
+          <a:fillRef idx="0">
+            <a:schemeClr val="dk1"/>
+          </a:fillRef>
+          <a:effectRef idx="0">
+            <a:schemeClr val="dk1"/>
+          </a:effectRef>
+          <a:fontRef idx="minor">
+            <a:schemeClr val="tx1"/>
+          </a:fontRef>
+        </p:style>
+      </p:cxnSp>
+      <p:cxnSp>
+        <p:nvCxnSpPr>
+          <p:cNvPr id="197" name="직선 화살표 연결선 196">
+            <a:extLst>
+              <a:ext uri="{FF2B5EF4-FFF2-40B4-BE49-F238E27FC236}">
+                <a16:creationId xmlns:a16="http://schemas.microsoft.com/office/drawing/2014/main" id="{44E04D2E-6572-4E7E-BE7B-DD4665C04D68}"/>
+              </a:ext>
+            </a:extLst>
+          </p:cNvPr>
+          <p:cNvCxnSpPr/>
+          <p:nvPr/>
+        </p:nvCxnSpPr>
+        <p:spPr>
+          <a:xfrm>
+            <a:off x="2208059" y="1049425"/>
+            <a:ext cx="360000" cy="0"/>
+          </a:xfrm>
+          <a:prstGeom prst="straightConnector1">
+            <a:avLst/>
+          </a:prstGeom>
+          <a:ln w="9525">
+            <a:tailEnd type="triangle"/>
+          </a:ln>
+        </p:spPr>
+        <p:style>
+          <a:lnRef idx="1">
+            <a:schemeClr val="dk1"/>
+          </a:lnRef>
+          <a:fillRef idx="0">
+            <a:schemeClr val="dk1"/>
+          </a:fillRef>
+          <a:effectRef idx="0">
+            <a:schemeClr val="dk1"/>
+          </a:effectRef>
+          <a:fontRef idx="minor">
+            <a:schemeClr val="tx1"/>
+          </a:fontRef>
+        </p:style>
+      </p:cxnSp>
+      <p:cxnSp>
+        <p:nvCxnSpPr>
+          <p:cNvPr id="198" name="직선 화살표 연결선 197">
+            <a:extLst>
+              <a:ext uri="{FF2B5EF4-FFF2-40B4-BE49-F238E27FC236}">
+                <a16:creationId xmlns:a16="http://schemas.microsoft.com/office/drawing/2014/main" id="{B79AD2C1-F1AE-425B-8AC6-B9B9752311B1}"/>
+              </a:ext>
+            </a:extLst>
+          </p:cNvPr>
+          <p:cNvCxnSpPr/>
+          <p:nvPr/>
+        </p:nvCxnSpPr>
+        <p:spPr>
+          <a:xfrm>
+            <a:off x="3738414" y="1049425"/>
+            <a:ext cx="360000" cy="0"/>
+          </a:xfrm>
+          <a:prstGeom prst="straightConnector1">
+            <a:avLst/>
+          </a:prstGeom>
+          <a:ln w="9525">
+            <a:tailEnd type="triangle"/>
+          </a:ln>
+        </p:spPr>
+        <p:style>
+          <a:lnRef idx="1">
+            <a:schemeClr val="dk1"/>
+          </a:lnRef>
+          <a:fillRef idx="0">
+            <a:schemeClr val="dk1"/>
+          </a:fillRef>
+          <a:effectRef idx="0">
+            <a:schemeClr val="dk1"/>
+          </a:effectRef>
+          <a:fontRef idx="minor">
+            <a:schemeClr val="tx1"/>
+          </a:fontRef>
+        </p:style>
+      </p:cxnSp>
+      <p:cxnSp>
+        <p:nvCxnSpPr>
+          <p:cNvPr id="199" name="직선 화살표 연결선 198">
+            <a:extLst>
+              <a:ext uri="{FF2B5EF4-FFF2-40B4-BE49-F238E27FC236}">
+                <a16:creationId xmlns:a16="http://schemas.microsoft.com/office/drawing/2014/main" id="{F7E10268-0DFB-4D57-B824-361F3D4BDA12}"/>
+              </a:ext>
+            </a:extLst>
+          </p:cNvPr>
+          <p:cNvCxnSpPr/>
+          <p:nvPr/>
+        </p:nvCxnSpPr>
+        <p:spPr>
+          <a:xfrm>
+            <a:off x="5235253" y="1044542"/>
+            <a:ext cx="360000" cy="0"/>
+          </a:xfrm>
+          <a:prstGeom prst="straightConnector1">
+            <a:avLst/>
+          </a:prstGeom>
+          <a:ln w="9525">
+            <a:tailEnd type="triangle"/>
+          </a:ln>
+        </p:spPr>
+        <p:style>
+          <a:lnRef idx="1">
+            <a:schemeClr val="dk1"/>
+          </a:lnRef>
+          <a:fillRef idx="0">
+            <a:schemeClr val="dk1"/>
+          </a:fillRef>
+          <a:effectRef idx="0">
+            <a:schemeClr val="dk1"/>
+          </a:effectRef>
+          <a:fontRef idx="minor">
+            <a:schemeClr val="tx1"/>
+          </a:fontRef>
+        </p:style>
+      </p:cxnSp>
+      <p:cxnSp>
+        <p:nvCxnSpPr>
+          <p:cNvPr id="200" name="직선 화살표 연결선 199">
+            <a:extLst>
+              <a:ext uri="{FF2B5EF4-FFF2-40B4-BE49-F238E27FC236}">
+                <a16:creationId xmlns:a16="http://schemas.microsoft.com/office/drawing/2014/main" id="{703E9595-4349-4DA2-9DBB-B6DA2961CA49}"/>
+              </a:ext>
+            </a:extLst>
+          </p:cNvPr>
+          <p:cNvCxnSpPr>
+            <a:cxnSpLocks/>
+          </p:cNvCxnSpPr>
+          <p:nvPr/>
+        </p:nvCxnSpPr>
+        <p:spPr>
+          <a:xfrm>
+            <a:off x="6063029" y="1396697"/>
+            <a:ext cx="0" cy="504000"/>
+          </a:xfrm>
+          <a:prstGeom prst="straightConnector1">
+            <a:avLst/>
+          </a:prstGeom>
+          <a:ln w="9525">
+            <a:tailEnd type="triangle"/>
+          </a:ln>
+        </p:spPr>
+        <p:style>
+          <a:lnRef idx="1">
+            <a:schemeClr val="dk1"/>
+          </a:lnRef>
+          <a:fillRef idx="0">
+            <a:schemeClr val="dk1"/>
+          </a:fillRef>
+          <a:effectRef idx="0">
+            <a:schemeClr val="dk1"/>
+          </a:effectRef>
+          <a:fontRef idx="minor">
+            <a:schemeClr val="tx1"/>
+          </a:fontRef>
+        </p:style>
+      </p:cxnSp>
+      <p:cxnSp>
+        <p:nvCxnSpPr>
+          <p:cNvPr id="201" name="직선 화살표 연결선 200">
+            <a:extLst>
+              <a:ext uri="{FF2B5EF4-FFF2-40B4-BE49-F238E27FC236}">
+                <a16:creationId xmlns:a16="http://schemas.microsoft.com/office/drawing/2014/main" id="{B8CB88A6-57C8-450F-BF5A-0416618E64A2}"/>
+              </a:ext>
+            </a:extLst>
+          </p:cNvPr>
+          <p:cNvCxnSpPr>
+            <a:cxnSpLocks/>
+          </p:cNvCxnSpPr>
+          <p:nvPr/>
+        </p:nvCxnSpPr>
+        <p:spPr>
+          <a:xfrm>
+            <a:off x="1122075" y="3984390"/>
+            <a:ext cx="696571" cy="1"/>
+          </a:xfrm>
+          <a:prstGeom prst="straightConnector1">
+            <a:avLst/>
+          </a:prstGeom>
+          <a:ln w="9525">
+            <a:tailEnd type="triangle"/>
+          </a:ln>
+        </p:spPr>
+        <p:style>
+          <a:lnRef idx="1">
+            <a:schemeClr val="dk1"/>
+          </a:lnRef>
+          <a:fillRef idx="0">
+            <a:schemeClr val="dk1"/>
+          </a:fillRef>
+          <a:effectRef idx="0">
+            <a:schemeClr val="dk1"/>
+          </a:effectRef>
+          <a:fontRef idx="minor">
+            <a:schemeClr val="tx1"/>
+          </a:fontRef>
+        </p:style>
+      </p:cxnSp>
+      <p:cxnSp>
+        <p:nvCxnSpPr>
+          <p:cNvPr id="204" name="직선 화살표 연결선 203">
+            <a:extLst>
+              <a:ext uri="{FF2B5EF4-FFF2-40B4-BE49-F238E27FC236}">
+                <a16:creationId xmlns:a16="http://schemas.microsoft.com/office/drawing/2014/main" id="{A580BB64-B8A9-4FA1-8323-07E814856CA4}"/>
+              </a:ext>
+            </a:extLst>
+          </p:cNvPr>
+          <p:cNvCxnSpPr>
+            <a:cxnSpLocks/>
+          </p:cNvCxnSpPr>
+          <p:nvPr/>
+        </p:nvCxnSpPr>
+        <p:spPr>
+          <a:xfrm>
+            <a:off x="2785534" y="3609454"/>
+            <a:ext cx="256538" cy="0"/>
+          </a:xfrm>
+          <a:prstGeom prst="straightConnector1">
+            <a:avLst/>
+          </a:prstGeom>
+          <a:ln w="9525">
+            <a:tailEnd type="triangle"/>
+          </a:ln>
+        </p:spPr>
+        <p:style>
+          <a:lnRef idx="1">
+            <a:schemeClr val="dk1"/>
+          </a:lnRef>
+          <a:fillRef idx="0">
+            <a:schemeClr val="dk1"/>
+          </a:fillRef>
+          <a:effectRef idx="0">
+            <a:schemeClr val="dk1"/>
+          </a:effectRef>
+          <a:fontRef idx="minor">
+            <a:schemeClr val="tx1"/>
+          </a:fontRef>
+        </p:style>
+      </p:cxnSp>
+      <p:cxnSp>
+        <p:nvCxnSpPr>
+          <p:cNvPr id="206" name="직선 화살표 연결선 205">
+            <a:extLst>
+              <a:ext uri="{FF2B5EF4-FFF2-40B4-BE49-F238E27FC236}">
+                <a16:creationId xmlns:a16="http://schemas.microsoft.com/office/drawing/2014/main" id="{30BCF7AA-E437-42B3-984C-967F003A8846}"/>
+              </a:ext>
+            </a:extLst>
+          </p:cNvPr>
+          <p:cNvCxnSpPr>
+            <a:cxnSpLocks/>
+          </p:cNvCxnSpPr>
+          <p:nvPr/>
+        </p:nvCxnSpPr>
+        <p:spPr>
+          <a:xfrm>
+            <a:off x="4007929" y="3586969"/>
+            <a:ext cx="256538" cy="0"/>
+          </a:xfrm>
+          <a:prstGeom prst="straightConnector1">
+            <a:avLst/>
+          </a:prstGeom>
+          <a:ln w="9525">
+            <a:tailEnd type="triangle"/>
+          </a:ln>
+        </p:spPr>
+        <p:style>
+          <a:lnRef idx="1">
+            <a:schemeClr val="dk1"/>
+          </a:lnRef>
+          <a:fillRef idx="0">
+            <a:schemeClr val="dk1"/>
+          </a:fillRef>
+          <a:effectRef idx="0">
+            <a:schemeClr val="dk1"/>
+          </a:effectRef>
+          <a:fontRef idx="minor">
+            <a:schemeClr val="tx1"/>
+          </a:fontRef>
+        </p:style>
+      </p:cxnSp>
+      <p:cxnSp>
+        <p:nvCxnSpPr>
+          <p:cNvPr id="208" name="직선 화살표 연결선 207">
+            <a:extLst>
+              <a:ext uri="{FF2B5EF4-FFF2-40B4-BE49-F238E27FC236}">
+                <a16:creationId xmlns:a16="http://schemas.microsoft.com/office/drawing/2014/main" id="{09193EF3-33FC-4351-813C-9325578A77ED}"/>
+              </a:ext>
+            </a:extLst>
+          </p:cNvPr>
+          <p:cNvCxnSpPr/>
+          <p:nvPr/>
+        </p:nvCxnSpPr>
+        <p:spPr>
+          <a:xfrm flipH="1">
+            <a:off x="3491354" y="3796740"/>
+            <a:ext cx="0" cy="288000"/>
+          </a:xfrm>
+          <a:prstGeom prst="straightConnector1">
+            <a:avLst/>
+          </a:prstGeom>
+          <a:ln>
+            <a:headEnd type="triangle"/>
+            <a:tailEnd type="triangle"/>
+          </a:ln>
+        </p:spPr>
+        <p:style>
+          <a:lnRef idx="1">
+            <a:schemeClr val="dk1"/>
+          </a:lnRef>
+          <a:fillRef idx="0">
+            <a:schemeClr val="dk1"/>
+          </a:fillRef>
+          <a:effectRef idx="0">
+            <a:schemeClr val="dk1"/>
+          </a:effectRef>
+          <a:fontRef idx="minor">
+            <a:schemeClr val="tx1"/>
+          </a:fontRef>
+        </p:style>
+      </p:cxnSp>
+      <p:cxnSp>
+        <p:nvCxnSpPr>
+          <p:cNvPr id="209" name="직선 화살표 연결선 208">
+            <a:extLst>
+              <a:ext uri="{FF2B5EF4-FFF2-40B4-BE49-F238E27FC236}">
+                <a16:creationId xmlns:a16="http://schemas.microsoft.com/office/drawing/2014/main" id="{398774E2-1170-4902-929D-FF7FFF4EF27E}"/>
+              </a:ext>
+            </a:extLst>
+          </p:cNvPr>
+          <p:cNvCxnSpPr>
+            <a:cxnSpLocks/>
+          </p:cNvCxnSpPr>
+          <p:nvPr/>
+        </p:nvCxnSpPr>
+        <p:spPr>
+          <a:xfrm>
+            <a:off x="5287718" y="3282986"/>
+            <a:ext cx="1656000" cy="0"/>
+          </a:xfrm>
+          <a:prstGeom prst="straightConnector1">
+            <a:avLst/>
+          </a:prstGeom>
+          <a:ln w="9525">
+            <a:tailEnd type="triangle"/>
+          </a:ln>
+        </p:spPr>
+        <p:style>
+          <a:lnRef idx="1">
+            <a:schemeClr val="dk1"/>
+          </a:lnRef>
+          <a:fillRef idx="0">
+            <a:schemeClr val="dk1"/>
+          </a:fillRef>
+          <a:effectRef idx="0">
+            <a:schemeClr val="dk1"/>
+          </a:effectRef>
+          <a:fontRef idx="minor">
+            <a:schemeClr val="tx1"/>
+          </a:fontRef>
+        </p:style>
+      </p:cxnSp>
+      <p:cxnSp>
+        <p:nvCxnSpPr>
+          <p:cNvPr id="214" name="연결선: 꺾임 213">
+            <a:extLst>
+              <a:ext uri="{FF2B5EF4-FFF2-40B4-BE49-F238E27FC236}">
+                <a16:creationId xmlns:a16="http://schemas.microsoft.com/office/drawing/2014/main" id="{9537701E-22C8-4A95-AD8A-8D6BA0A770E8}"/>
+              </a:ext>
+            </a:extLst>
+          </p:cNvPr>
+          <p:cNvCxnSpPr>
+            <a:cxnSpLocks/>
+          </p:cNvCxnSpPr>
+          <p:nvPr/>
+        </p:nvCxnSpPr>
+        <p:spPr>
+          <a:xfrm rot="10800000" flipV="1">
+            <a:off x="6611403" y="3643759"/>
+            <a:ext cx="682463" cy="583552"/>
+          </a:xfrm>
+          <a:prstGeom prst="bentConnector3">
+            <a:avLst>
+              <a:gd name="adj1" fmla="val 579"/>
+            </a:avLst>
+          </a:prstGeom>
+          <a:ln w="9525">
+            <a:tailEnd type="triangle"/>
+          </a:ln>
+        </p:spPr>
+        <p:style>
+          <a:lnRef idx="1">
+            <a:schemeClr val="dk1"/>
+          </a:lnRef>
+          <a:fillRef idx="0">
+            <a:schemeClr val="dk1"/>
+          </a:fillRef>
+          <a:effectRef idx="0">
+            <a:schemeClr val="dk1"/>
+          </a:effectRef>
+          <a:fontRef idx="minor">
+            <a:schemeClr val="tx1"/>
+          </a:fontRef>
+        </p:style>
+      </p:cxnSp>
+      <p:cxnSp>
+        <p:nvCxnSpPr>
+          <p:cNvPr id="219" name="직선 화살표 연결선 218">
+            <a:extLst>
+              <a:ext uri="{FF2B5EF4-FFF2-40B4-BE49-F238E27FC236}">
+                <a16:creationId xmlns:a16="http://schemas.microsoft.com/office/drawing/2014/main" id="{B36FB66D-8A1D-4843-A35E-8A1F14A0BB47}"/>
+              </a:ext>
+            </a:extLst>
+          </p:cNvPr>
+          <p:cNvCxnSpPr>
+            <a:cxnSpLocks/>
+          </p:cNvCxnSpPr>
+          <p:nvPr/>
+        </p:nvCxnSpPr>
+        <p:spPr>
+          <a:xfrm flipV="1">
+            <a:off x="5296634" y="2618611"/>
+            <a:ext cx="1591346" cy="334593"/>
+          </a:xfrm>
+          <a:prstGeom prst="straightConnector1">
+            <a:avLst/>
+          </a:prstGeom>
+          <a:ln w="9525">
+            <a:tailEnd type="triangle"/>
+          </a:ln>
+        </p:spPr>
+        <p:style>
+          <a:lnRef idx="1">
+            <a:schemeClr val="dk1"/>
+          </a:lnRef>
+          <a:fillRef idx="0">
+            <a:schemeClr val="dk1"/>
+          </a:fillRef>
+          <a:effectRef idx="0">
+            <a:schemeClr val="dk1"/>
+          </a:effectRef>
+          <a:fontRef idx="minor">
+            <a:schemeClr val="tx1"/>
+          </a:fontRef>
+        </p:style>
+      </p:cxnSp>
+      <p:sp>
+        <p:nvSpPr>
+          <p:cNvPr id="221" name="TextBox 220">
+            <a:extLst>
+              <a:ext uri="{FF2B5EF4-FFF2-40B4-BE49-F238E27FC236}">
+                <a16:creationId xmlns:a16="http://schemas.microsoft.com/office/drawing/2014/main" id="{65037865-0AE7-49C1-8200-1AA55C56616F}"/>
+              </a:ext>
+            </a:extLst>
+          </p:cNvPr>
+          <p:cNvSpPr txBox="1"/>
+          <p:nvPr/>
+        </p:nvSpPr>
+        <p:spPr>
+          <a:xfrm>
+            <a:off x="1770692" y="1779413"/>
+            <a:ext cx="1362059" cy="307777"/>
+          </a:xfrm>
+          <a:prstGeom prst="rect">
+            <a:avLst/>
+          </a:prstGeom>
+          <a:noFill/>
+        </p:spPr>
+        <p:txBody>
+          <a:bodyPr wrap="square" rtlCol="0">
+            <a:spAutoFit/>
+          </a:bodyPr>
+          <a:lstStyle/>
+          <a:p>
+            <a:r>
+              <a:rPr lang="en-US" altLang="ko-KR" sz="1400" dirty="0"/>
+              <a:t>Containers</a:t>
+            </a:r>
+            <a:endParaRPr lang="ko-KR" altLang="en-US" sz="1400" dirty="0"/>
+          </a:p>
+        </p:txBody>
+      </p:sp>
+      <p:pic>
+        <p:nvPicPr>
+          <p:cNvPr id="223" name="그림 222" descr="그리기이(가) 표시된 사진&#10;&#10;자동 생성된 설명">
+            <a:extLst>
+              <a:ext uri="{FF2B5EF4-FFF2-40B4-BE49-F238E27FC236}">
+                <a16:creationId xmlns:a16="http://schemas.microsoft.com/office/drawing/2014/main" id="{F1A436C8-C871-40AB-935A-0E5CE442FB61}"/>
+              </a:ext>
+            </a:extLst>
+          </p:cNvPr>
+          <p:cNvPicPr>
+            <a:picLocks noChangeAspect="1"/>
+          </p:cNvPicPr>
+          <p:nvPr/>
+        </p:nvPicPr>
+        <p:blipFill>
+          <a:blip r:embed="rId15"/>
+          <a:stretch>
+            <a:fillRect/>
+          </a:stretch>
+        </p:blipFill>
+        <p:spPr>
+          <a:xfrm>
+            <a:off x="4549515" y="2475110"/>
+            <a:ext cx="397239" cy="243689"/>
+          </a:xfrm>
+          <a:prstGeom prst="rect">
+            <a:avLst/>
+          </a:prstGeom>
+        </p:spPr>
+      </p:pic>
+      <p:cxnSp>
+        <p:nvCxnSpPr>
+          <p:cNvPr id="225" name="직선 연결선 224">
+            <a:extLst>
+              <a:ext uri="{FF2B5EF4-FFF2-40B4-BE49-F238E27FC236}">
+                <a16:creationId xmlns:a16="http://schemas.microsoft.com/office/drawing/2014/main" id="{D3873BFD-683F-4449-8882-0D483704FB27}"/>
+              </a:ext>
+            </a:extLst>
+          </p:cNvPr>
+          <p:cNvCxnSpPr>
+            <a:cxnSpLocks/>
+          </p:cNvCxnSpPr>
+          <p:nvPr/>
+        </p:nvCxnSpPr>
+        <p:spPr>
+          <a:xfrm>
+            <a:off x="4292881" y="2774700"/>
+            <a:ext cx="938322" cy="0"/>
+          </a:xfrm>
+          <a:prstGeom prst="line">
+            <a:avLst/>
+          </a:prstGeom>
+          <a:ln w="3175">
+            <a:solidFill>
+              <a:schemeClr val="bg2">
+                <a:lumMod val="90000"/>
+              </a:schemeClr>
+            </a:solidFill>
+          </a:ln>
+        </p:spPr>
+        <p:style>
+          <a:lnRef idx="1">
+            <a:schemeClr val="accent1"/>
+          </a:lnRef>
+          <a:fillRef idx="0">
+            <a:schemeClr val="accent1"/>
+          </a:fillRef>
+          <a:effectRef idx="0">
+            <a:schemeClr val="accent1"/>
+          </a:effectRef>
+          <a:fontRef idx="minor">
+            <a:schemeClr val="tx1"/>
+          </a:fontRef>
+        </p:style>
+      </p:cxnSp>
+      <p:pic>
+        <p:nvPicPr>
+          <p:cNvPr id="228" name="그림 227" descr="그리기이(가) 표시된 사진&#10;&#10;자동 생성된 설명">
+            <a:extLst>
+              <a:ext uri="{FF2B5EF4-FFF2-40B4-BE49-F238E27FC236}">
+                <a16:creationId xmlns:a16="http://schemas.microsoft.com/office/drawing/2014/main" id="{1A56512C-28B9-4F75-A9A0-F580011B0B61}"/>
+              </a:ext>
+            </a:extLst>
+          </p:cNvPr>
+          <p:cNvPicPr>
+            <a:picLocks noChangeAspect="1"/>
+          </p:cNvPicPr>
+          <p:nvPr/>
+        </p:nvPicPr>
+        <p:blipFill>
+          <a:blip r:embed="rId16"/>
+          <a:stretch>
+            <a:fillRect/>
+          </a:stretch>
+        </p:blipFill>
+        <p:spPr>
+          <a:xfrm>
+            <a:off x="3074084" y="3454474"/>
+            <a:ext cx="902214" cy="307777"/>
+          </a:xfrm>
+          <a:prstGeom prst="rect">
+            <a:avLst/>
+          </a:prstGeom>
+          <a:ln w="12700">
+            <a:solidFill>
+              <a:schemeClr val="tx1"/>
+            </a:solidFill>
+          </a:ln>
+        </p:spPr>
+      </p:pic>
+      <p:pic>
+        <p:nvPicPr>
+          <p:cNvPr id="230" name="그림 229" descr="게임이(가) 표시된 사진&#10;&#10;자동 생성된 설명">
+            <a:extLst>
+              <a:ext uri="{FF2B5EF4-FFF2-40B4-BE49-F238E27FC236}">
+                <a16:creationId xmlns:a16="http://schemas.microsoft.com/office/drawing/2014/main" id="{527CD5B9-2413-47AB-B538-94EC70AB5FF5}"/>
+              </a:ext>
+            </a:extLst>
+          </p:cNvPr>
+          <p:cNvPicPr>
+            <a:picLocks noChangeAspect="1"/>
+          </p:cNvPicPr>
+          <p:nvPr/>
+        </p:nvPicPr>
+        <p:blipFill>
+          <a:blip r:embed="rId17"/>
+          <a:stretch>
+            <a:fillRect/>
+          </a:stretch>
+        </p:blipFill>
+        <p:spPr>
+          <a:xfrm>
+            <a:off x="6009966" y="4083228"/>
+            <a:ext cx="516851" cy="344567"/>
+          </a:xfrm>
+          <a:prstGeom prst="rect">
+            <a:avLst/>
+          </a:prstGeom>
+          <a:ln w="12700">
+            <a:solidFill>
+              <a:schemeClr val="tx1"/>
+            </a:solidFill>
+          </a:ln>
+        </p:spPr>
+      </p:pic>
+    </p:spTree>
+    <p:extLst>
+      <p:ext uri="{BB962C8B-B14F-4D97-AF65-F5344CB8AC3E}">
+        <p14:creationId xmlns:p14="http://schemas.microsoft.com/office/powerpoint/2010/main" val="73016882"/>
       </p:ext>
     </p:extLst>
   </p:cSld>

</xml_diff>